<commit_message>
Update next steps with distorted UMAP
</commit_message>
<xml_diff>
--- a/linsley_postdoc/presentations/9_28_23_weekly_meeting.pptx
+++ b/linsley_postdoc/presentations/9_28_23_weekly_meeting.pptx
@@ -1971,7 +1971,6 @@
               </a:rPr>
               <a:t> that were not annotated as CD8/CD4 T cells were included in a T or NKT cell group, denoted T/NKT</a:t>
             </a:r>
-            <a:endParaRPr lang="en-US" dirty="0"/>
           </a:p>
         </p:txBody>
       </p:sp>
@@ -2158,8 +2157,19 @@
             </a:pPr>
             <a:r>
               <a:rPr lang="en-US" dirty="0"/>
-              <a:t>Maybe I’m removing “RBCs/platelets” that are actually other relevant cell types here, and removing too many cells distorts dimensional reduction upon re-running</a:t>
-            </a:r>
+              <a:t>Maybe I’m removing “RBCs/platelets” that are actually other relevant cell types here, and removing too many cells distorts dimensional reduction upon re-running, i</a:t>
+            </a:r>
+            <a:r>
+              <a:rPr lang="en-US" b="0" i="0" dirty="0">
+                <a:solidFill>
+                  <a:srgbClr val="212121"/>
+                </a:solidFill>
+                <a:effectLst/>
+                <a:latin typeface="Cambria" panose="02040503050406030204" pitchFamily="18" charset="0"/>
+              </a:rPr>
+              <a:t>.e. see CD14 plot from slide 9 (higher than should be likely for RBC/platelet)</a:t>
+            </a:r>
+            <a:endParaRPr lang="en-US" dirty="0"/>
           </a:p>
         </p:txBody>
       </p:sp>
@@ -6053,6 +6063,23 @@
           <a:lstStyle/>
           <a:p>
             <a:r>
+              <a:rPr lang="en-US" dirty="0"/>
+              <a:t>Check cell type assignment</a:t>
+            </a:r>
+          </a:p>
+          <a:p>
+            <a:pPr lvl="1"/>
+            <a:r>
+              <a:rPr lang="en-US" dirty="0"/>
+              <a:t>Seurat </a:t>
+            </a:r>
+            <a:r>
+              <a:rPr lang="en-US"/>
+              <a:t>reference mapping</a:t>
+            </a:r>
+          </a:p>
+          <a:p>
+            <a:r>
               <a:rPr lang="en-US" dirty="0" err="1"/>
               <a:t>Subclustering</a:t>
             </a:r>
@@ -7571,10 +7598,10 @@
       </p:sp>
       <p:pic>
         <p:nvPicPr>
-          <p:cNvPr id="5" name="Picture 4">
-            <a:extLst>
-              <a:ext uri="{FF2B5EF4-FFF2-40B4-BE49-F238E27FC236}">
-                <a16:creationId xmlns:a16="http://schemas.microsoft.com/office/drawing/2014/main" id="{CF625FE2-7A8C-24FE-06F1-DF8D3831F5BF}"/>
+          <p:cNvPr id="13" name="Picture 12">
+            <a:extLst>
+              <a:ext uri="{FF2B5EF4-FFF2-40B4-BE49-F238E27FC236}">
+                <a16:creationId xmlns:a16="http://schemas.microsoft.com/office/drawing/2014/main" id="{AE80C45E-AF21-6BB9-1D26-0572B7A2AC3D}"/>
               </a:ext>
             </a:extLst>
           </p:cNvPr>
@@ -7591,8 +7618,8 @@
         </p:blipFill>
         <p:spPr>
           <a:xfrm>
-            <a:off x="1152732" y="1246558"/>
-            <a:ext cx="4653171" cy="2793236"/>
+            <a:off x="1752821" y="1378581"/>
+            <a:ext cx="4248580" cy="2705346"/>
           </a:xfrm>
           <a:prstGeom prst="rect">
             <a:avLst/>
@@ -7601,10 +7628,10 @@
       </p:pic>
       <p:pic>
         <p:nvPicPr>
-          <p:cNvPr id="9" name="Picture 8">
-            <a:extLst>
-              <a:ext uri="{FF2B5EF4-FFF2-40B4-BE49-F238E27FC236}">
-                <a16:creationId xmlns:a16="http://schemas.microsoft.com/office/drawing/2014/main" id="{A0E7B21A-5E47-DB82-DF47-0B4348E0607D}"/>
+          <p:cNvPr id="15" name="Picture 14">
+            <a:extLst>
+              <a:ext uri="{FF2B5EF4-FFF2-40B4-BE49-F238E27FC236}">
+                <a16:creationId xmlns:a16="http://schemas.microsoft.com/office/drawing/2014/main" id="{A16D8A15-545C-087A-BB71-76A517568FBD}"/>
               </a:ext>
             </a:extLst>
           </p:cNvPr>
@@ -7621,8 +7648,8 @@
         </p:blipFill>
         <p:spPr>
           <a:xfrm>
-            <a:off x="1136742" y="4039794"/>
-            <a:ext cx="4637181" cy="2793236"/>
+            <a:off x="3817755" y="4083927"/>
+            <a:ext cx="4367291" cy="2774073"/>
           </a:xfrm>
           <a:prstGeom prst="rect">
             <a:avLst/>
@@ -7631,10 +7658,10 @@
       </p:pic>
       <p:pic>
         <p:nvPicPr>
-          <p:cNvPr id="11" name="Picture 10">
-            <a:extLst>
-              <a:ext uri="{FF2B5EF4-FFF2-40B4-BE49-F238E27FC236}">
-                <a16:creationId xmlns:a16="http://schemas.microsoft.com/office/drawing/2014/main" id="{31AE0E5D-DB6A-CAFA-D070-033F2A39089E}"/>
+          <p:cNvPr id="17" name="Picture 16">
+            <a:extLst>
+              <a:ext uri="{FF2B5EF4-FFF2-40B4-BE49-F238E27FC236}">
+                <a16:creationId xmlns:a16="http://schemas.microsoft.com/office/drawing/2014/main" id="{14B8CB17-2D09-0679-18EC-7F77D5837DFC}"/>
               </a:ext>
             </a:extLst>
           </p:cNvPr>
@@ -7651,8 +7678,8 @@
         </p:blipFill>
         <p:spPr>
           <a:xfrm>
-            <a:off x="5805903" y="1201401"/>
-            <a:ext cx="4637181" cy="2838393"/>
+            <a:off x="6001401" y="1378852"/>
+            <a:ext cx="4404779" cy="2724090"/>
           </a:xfrm>
           <a:prstGeom prst="rect">
             <a:avLst/>

</xml_diff>

<commit_message>
Update weekly meeting pres
</commit_message>
<xml_diff>
--- a/linsley_postdoc/presentations/9_28_23_weekly_meeting.pptx
+++ b/linsley_postdoc/presentations/9_28_23_weekly_meeting.pptx
@@ -221,7 +221,7 @@
           <a:p>
             <a:fld id="{E933A773-0DCE-3544-BB67-D5FA58DF903C}" type="datetimeFigureOut">
               <a:rPr lang="en-US" smtClean="0"/>
-              <a:t>9/26/2023</a:t>
+              <a:t>9/27/23</a:t>
             </a:fld>
             <a:endParaRPr lang="en-US"/>
           </a:p>
@@ -2169,6 +2169,61 @@
               </a:rPr>
               <a:t>.e. see CD14 plot from slide 9 (higher than should be likely for RBC/platelet)</a:t>
             </a:r>
+          </a:p>
+          <a:p>
+            <a:pPr marL="0" marR="0" lvl="0" indent="0" algn="l" defTabSz="914400" rtl="0" eaLnBrk="1" fontAlgn="auto" latinLnBrk="0" hangingPunct="1">
+              <a:lnSpc>
+                <a:spcPct val="100000"/>
+              </a:lnSpc>
+              <a:spcBef>
+                <a:spcPts val="0"/>
+              </a:spcBef>
+              <a:spcAft>
+                <a:spcPts val="0"/>
+              </a:spcAft>
+              <a:buClrTx/>
+              <a:buSzTx/>
+              <a:buFontTx/>
+              <a:buNone/>
+              <a:tabLst/>
+              <a:defRPr/>
+            </a:pPr>
+            <a:endParaRPr lang="en-US" b="0" i="0" dirty="0">
+              <a:solidFill>
+                <a:srgbClr val="212121"/>
+              </a:solidFill>
+              <a:effectLst/>
+              <a:latin typeface="Cambria" panose="02040503050406030204" pitchFamily="18" charset="0"/>
+            </a:endParaRPr>
+          </a:p>
+          <a:p>
+            <a:pPr marL="0" marR="0" lvl="0" indent="0" algn="l" defTabSz="914400" rtl="0" eaLnBrk="1" fontAlgn="auto" latinLnBrk="0" hangingPunct="1">
+              <a:lnSpc>
+                <a:spcPct val="100000"/>
+              </a:lnSpc>
+              <a:spcBef>
+                <a:spcPts val="0"/>
+              </a:spcBef>
+              <a:spcAft>
+                <a:spcPts val="0"/>
+              </a:spcAft>
+              <a:buClrTx/>
+              <a:buSzTx/>
+              <a:buFontTx/>
+              <a:buNone/>
+              <a:tabLst/>
+              <a:defRPr/>
+            </a:pPr>
+            <a:r>
+              <a:rPr lang="en-US" b="0" i="0" dirty="0">
+                <a:solidFill>
+                  <a:srgbClr val="212121"/>
+                </a:solidFill>
+                <a:effectLst/>
+                <a:latin typeface="Cambria" panose="02040503050406030204" pitchFamily="18" charset="0"/>
+              </a:rPr>
+              <a:t>Also check B cells misannotated as RBCs/platelets?</a:t>
+            </a:r>
             <a:endParaRPr lang="en-US" dirty="0"/>
           </a:p>
         </p:txBody>
@@ -2524,7 +2579,7 @@
           <a:p>
             <a:fld id="{80FC6068-BAFB-FC44-B9D8-F4B3BB105DE6}" type="datetimeFigureOut">
               <a:rPr lang="en-US" smtClean="0"/>
-              <a:t>9/26/2023</a:t>
+              <a:t>9/27/23</a:t>
             </a:fld>
             <a:endParaRPr lang="en-US"/>
           </a:p>
@@ -2722,7 +2777,7 @@
           <a:p>
             <a:fld id="{80FC6068-BAFB-FC44-B9D8-F4B3BB105DE6}" type="datetimeFigureOut">
               <a:rPr lang="en-US" smtClean="0"/>
-              <a:t>9/26/2023</a:t>
+              <a:t>9/27/23</a:t>
             </a:fld>
             <a:endParaRPr lang="en-US"/>
           </a:p>
@@ -2930,7 +2985,7 @@
           <a:p>
             <a:fld id="{80FC6068-BAFB-FC44-B9D8-F4B3BB105DE6}" type="datetimeFigureOut">
               <a:rPr lang="en-US" smtClean="0"/>
-              <a:t>9/26/2023</a:t>
+              <a:t>9/27/23</a:t>
             </a:fld>
             <a:endParaRPr lang="en-US"/>
           </a:p>
@@ -3134,7 +3189,7 @@
           <a:p>
             <a:fld id="{80FC6068-BAFB-FC44-B9D8-F4B3BB105DE6}" type="datetimeFigureOut">
               <a:rPr lang="en-US" smtClean="0"/>
-              <a:t>9/26/2023</a:t>
+              <a:t>9/27/23</a:t>
             </a:fld>
             <a:endParaRPr lang="en-US"/>
           </a:p>
@@ -3425,7 +3480,7 @@
           <a:p>
             <a:fld id="{80FC6068-BAFB-FC44-B9D8-F4B3BB105DE6}" type="datetimeFigureOut">
               <a:rPr lang="en-US" smtClean="0"/>
-              <a:t>9/26/2023</a:t>
+              <a:t>9/27/23</a:t>
             </a:fld>
             <a:endParaRPr lang="en-US"/>
           </a:p>
@@ -3690,7 +3745,7 @@
           <a:p>
             <a:fld id="{80FC6068-BAFB-FC44-B9D8-F4B3BB105DE6}" type="datetimeFigureOut">
               <a:rPr lang="en-US" smtClean="0"/>
-              <a:t>9/26/2023</a:t>
+              <a:t>9/27/23</a:t>
             </a:fld>
             <a:endParaRPr lang="en-US"/>
           </a:p>
@@ -4102,7 +4157,7 @@
           <a:p>
             <a:fld id="{80FC6068-BAFB-FC44-B9D8-F4B3BB105DE6}" type="datetimeFigureOut">
               <a:rPr lang="en-US" smtClean="0"/>
-              <a:t>9/26/2023</a:t>
+              <a:t>9/27/23</a:t>
             </a:fld>
             <a:endParaRPr lang="en-US"/>
           </a:p>
@@ -4243,7 +4298,7 @@
           <a:p>
             <a:fld id="{80FC6068-BAFB-FC44-B9D8-F4B3BB105DE6}" type="datetimeFigureOut">
               <a:rPr lang="en-US" smtClean="0"/>
-              <a:t>9/26/2023</a:t>
+              <a:t>9/27/23</a:t>
             </a:fld>
             <a:endParaRPr lang="en-US"/>
           </a:p>
@@ -4356,7 +4411,7 @@
           <a:p>
             <a:fld id="{80FC6068-BAFB-FC44-B9D8-F4B3BB105DE6}" type="datetimeFigureOut">
               <a:rPr lang="en-US" smtClean="0"/>
-              <a:t>9/26/2023</a:t>
+              <a:t>9/27/23</a:t>
             </a:fld>
             <a:endParaRPr lang="en-US"/>
           </a:p>
@@ -4667,7 +4722,7 @@
           <a:p>
             <a:fld id="{80FC6068-BAFB-FC44-B9D8-F4B3BB105DE6}" type="datetimeFigureOut">
               <a:rPr lang="en-US" smtClean="0"/>
-              <a:t>9/26/2023</a:t>
+              <a:t>9/27/23</a:t>
             </a:fld>
             <a:endParaRPr lang="en-US"/>
           </a:p>
@@ -4955,7 +5010,7 @@
           <a:p>
             <a:fld id="{80FC6068-BAFB-FC44-B9D8-F4B3BB105DE6}" type="datetimeFigureOut">
               <a:rPr lang="en-US" smtClean="0"/>
-              <a:t>9/26/2023</a:t>
+              <a:t>9/27/23</a:t>
             </a:fld>
             <a:endParaRPr lang="en-US"/>
           </a:p>
@@ -5196,7 +5251,7 @@
           <a:p>
             <a:fld id="{80FC6068-BAFB-FC44-B9D8-F4B3BB105DE6}" type="datetimeFigureOut">
               <a:rPr lang="en-US" smtClean="0"/>
-              <a:t>9/26/2023</a:t>
+              <a:t>9/27/23</a:t>
             </a:fld>
             <a:endParaRPr lang="en-US"/>
           </a:p>
@@ -6071,11 +6126,22 @@
             <a:pPr lvl="1"/>
             <a:r>
               <a:rPr lang="en-US" dirty="0"/>
-              <a:t>Seurat </a:t>
+              <a:t>Impose </a:t>
+            </a:r>
+            <a:r>
+              <a:rPr lang="en-US" dirty="0" err="1"/>
+              <a:t>percent.hemoglobin</a:t>
             </a:r>
             <a:r>
               <a:rPr lang="en-US"/>
-              <a:t>reference mapping</a:t>
+              <a:t> cutoff?</a:t>
+            </a:r>
+          </a:p>
+          <a:p>
+            <a:pPr lvl="1"/>
+            <a:r>
+              <a:rPr lang="en-US" dirty="0"/>
+              <a:t>Seurat reference mapping</a:t>
             </a:r>
           </a:p>
           <a:p>
@@ -6846,23 +6912,13 @@
             </a:pPr>
             <a:r>
               <a:rPr lang="en-US" dirty="0"/>
-              <a:t>Create Seurat object from counts &amp; metadata</a:t>
-            </a:r>
-          </a:p>
-          <a:p>
-            <a:pPr marL="514350" indent="-514350">
-              <a:buFont typeface="+mj-lt"/>
-              <a:buAutoNum type="arabicPeriod"/>
-            </a:pPr>
-            <a:r>
-              <a:rPr lang="en-US" dirty="0"/>
-              <a:t>Perform QC, yielding 24,807 cells</a:t>
+              <a:t>24,807 cells</a:t>
             </a:r>
           </a:p>
           <a:p>
             <a:pPr marL="971550" lvl="1" indent="-514350">
               <a:buFont typeface="+mj-lt"/>
-              <a:buAutoNum type="arabicPeriod"/>
+              <a:buAutoNum type="alphaLcParenR"/>
             </a:pPr>
             <a:r>
               <a:rPr lang="en-US" dirty="0"/>
@@ -6876,11 +6932,11 @@
           <a:p>
             <a:pPr marL="971550" lvl="1" indent="-514350">
               <a:buFont typeface="+mj-lt"/>
-              <a:buAutoNum type="arabicPeriod"/>
+              <a:buAutoNum type="alphaLcParenR"/>
             </a:pPr>
             <a:r>
               <a:rPr lang="en-US" dirty="0"/>
-              <a:t>I assume they already removed these cells before uploading data to GEO (I filtered 0 cells out)</a:t>
+              <a:t>I assume they already removed these cells before uploading data to GEO (I filter 0 cells out)</a:t>
             </a:r>
           </a:p>
         </p:txBody>
@@ -7378,7 +7434,7 @@
             </a:r>
             <a:r>
               <a:rPr lang="en-US" dirty="0"/>
-              <a:t> UMAP colored by patient ID largely recapitulates Newman lab figure</a:t>
+              <a:t> UMAP colored by patient ID largely recapitulates figure 3A</a:t>
             </a:r>
           </a:p>
         </p:txBody>

</xml_diff>